<commit_message>
added lesson 3 of this module.
Signed-off-by: Mindkid <prm.4555@gamil.com>
</commit_message>
<xml_diff>
--- a/1 - Programming Logic/Theoretical Lessons/Programming_Logic_2.pptx
+++ b/1 - Programming Logic/Theoretical Lessons/Programming_Logic_2.pptx
@@ -8963,7 +8963,7 @@
                 <a16:creationId xmlns:a16="http://schemas.microsoft.com/office/drawing/2014/main" id="{62A21665-C64F-4BDA-B2DE-442D70605718}"/>
               </a:ext>
               <a:ext uri="{C183D7F6-B498-43B3-948B-1728B52AA6E4}">
-                <adec:decorative xmlns="" xmlns:adec="http://schemas.microsoft.com/office/drawing/2017/decorative" val="1"/>
+                <adec:decorative xmlns:adec="http://schemas.microsoft.com/office/drawing/2017/decorative" xmlns="" val="1"/>
               </a:ext>
             </a:extLst>
           </p:cNvPr>
@@ -10213,7 +10213,42 @@
                 <a:latin typeface="Calibri" panose="020F0502020204030204" pitchFamily="34" charset="0"/>
                 <a:cs typeface="Calibri" panose="020F0502020204030204" pitchFamily="34" charset="0"/>
               </a:rPr>
-              <a:t>:</a:t>
+              <a:t> </a:t>
+            </a:r>
+            <a:r>
+              <a:rPr lang="pt-PT" sz="3200" dirty="0" smtClean="0">
+                <a:latin typeface="Calibri" panose="020F0502020204030204" pitchFamily="34" charset="0"/>
+                <a:cs typeface="Calibri" panose="020F0502020204030204" pitchFamily="34" charset="0"/>
+              </a:rPr>
+              <a:t>(</a:t>
+            </a:r>
+            <a:r>
+              <a:rPr lang="pt-PT" sz="3200" dirty="0" err="1" smtClean="0">
+                <a:latin typeface="Calibri" panose="020F0502020204030204" pitchFamily="34" charset="0"/>
+                <a:cs typeface="Calibri" panose="020F0502020204030204" pitchFamily="34" charset="0"/>
+              </a:rPr>
+              <a:t>according</a:t>
+            </a:r>
+            <a:r>
+              <a:rPr lang="pt-PT" sz="3200" dirty="0" smtClean="0">
+                <a:latin typeface="Calibri" panose="020F0502020204030204" pitchFamily="34" charset="0"/>
+                <a:cs typeface="Calibri" panose="020F0502020204030204" pitchFamily="34" charset="0"/>
+              </a:rPr>
+              <a:t> </a:t>
+            </a:r>
+            <a:r>
+              <a:rPr lang="pt-PT" sz="3200" dirty="0" err="1" smtClean="0">
+                <a:latin typeface="Calibri" panose="020F0502020204030204" pitchFamily="34" charset="0"/>
+                <a:cs typeface="Calibri" panose="020F0502020204030204" pitchFamily="34" charset="0"/>
+              </a:rPr>
+              <a:t>with</a:t>
+            </a:r>
+            <a:r>
+              <a:rPr lang="pt-PT" sz="3200" dirty="0" smtClean="0">
+                <a:latin typeface="Calibri" panose="020F0502020204030204" pitchFamily="34" charset="0"/>
+                <a:cs typeface="Calibri" panose="020F0502020204030204" pitchFamily="34" charset="0"/>
+              </a:rPr>
+              <a:t> C)</a:t>
             </a:r>
             <a:endParaRPr lang="pt-PT" sz="5400" dirty="0">
               <a:latin typeface="Calibri" panose="020F0502020204030204" pitchFamily="34" charset="0"/>
@@ -10231,7 +10266,7 @@
         <p:spPr>
           <a:xfrm>
             <a:off x="697230" y="1624965"/>
-            <a:ext cx="9715500" cy="4524315"/>
+            <a:ext cx="9715500" cy="5078313"/>
           </a:xfrm>
           <a:prstGeom prst="rect">
             <a:avLst/>
@@ -10304,6 +10339,97 @@
               </a:rPr>
               <a:t>  8 bits </a:t>
             </a:r>
+            <a:endParaRPr lang="pt-PT" sz="3600" dirty="0" smtClean="0">
+              <a:latin typeface="Calibri" panose="020F0502020204030204" pitchFamily="34" charset="0"/>
+              <a:cs typeface="Calibri" panose="020F0502020204030204" pitchFamily="34" charset="0"/>
+            </a:endParaRPr>
+          </a:p>
+          <a:p>
+            <a:pPr marL="571500" indent="-571500">
+              <a:buFont typeface="Arial" panose="020B0604020202020204" pitchFamily="34" charset="0"/>
+              <a:buChar char="•"/>
+            </a:pPr>
+            <a:r>
+              <a:rPr lang="pt-PT" sz="3600" b="1" dirty="0" smtClean="0">
+                <a:latin typeface="Calibri" panose="020F0502020204030204" pitchFamily="34" charset="0"/>
+                <a:cs typeface="Calibri" panose="020F0502020204030204" pitchFamily="34" charset="0"/>
+              </a:rPr>
+              <a:t>s</a:t>
+            </a:r>
+            <a:r>
+              <a:rPr lang="pt-PT" sz="3600" b="1" dirty="0" smtClean="0">
+                <a:latin typeface="Calibri" panose="020F0502020204030204" pitchFamily="34" charset="0"/>
+                <a:cs typeface="Calibri" panose="020F0502020204030204" pitchFamily="34" charset="0"/>
+              </a:rPr>
+              <a:t>hort</a:t>
+            </a:r>
+            <a:r>
+              <a:rPr lang="pt-PT" sz="3600" dirty="0">
+                <a:latin typeface="Calibri" panose="020F0502020204030204" pitchFamily="34" charset="0"/>
+                <a:cs typeface="Calibri" panose="020F0502020204030204" pitchFamily="34" charset="0"/>
+              </a:rPr>
+              <a:t> </a:t>
+            </a:r>
+            <a:r>
+              <a:rPr lang="pt-PT" sz="3600" dirty="0" smtClean="0">
+                <a:latin typeface="Calibri" panose="020F0502020204030204" pitchFamily="34" charset="0"/>
+                <a:cs typeface="Calibri" panose="020F0502020204030204" pitchFamily="34" charset="0"/>
+              </a:rPr>
+              <a:t>– A </a:t>
+            </a:r>
+            <a:r>
+              <a:rPr lang="pt-PT" sz="3600" dirty="0" err="1" smtClean="0">
+                <a:latin typeface="Calibri" panose="020F0502020204030204" pitchFamily="34" charset="0"/>
+                <a:cs typeface="Calibri" panose="020F0502020204030204" pitchFamily="34" charset="0"/>
+              </a:rPr>
+              <a:t>small</a:t>
+            </a:r>
+            <a:r>
+              <a:rPr lang="pt-PT" sz="3600" dirty="0" smtClean="0">
+                <a:latin typeface="Calibri" panose="020F0502020204030204" pitchFamily="34" charset="0"/>
+                <a:cs typeface="Calibri" panose="020F0502020204030204" pitchFamily="34" charset="0"/>
+              </a:rPr>
+              <a:t> </a:t>
+            </a:r>
+            <a:r>
+              <a:rPr lang="pt-PT" sz="3600" dirty="0" err="1" smtClean="0">
+                <a:latin typeface="Calibri" panose="020F0502020204030204" pitchFamily="34" charset="0"/>
+                <a:cs typeface="Calibri" panose="020F0502020204030204" pitchFamily="34" charset="0"/>
+              </a:rPr>
+              <a:t>number</a:t>
+            </a:r>
+            <a:r>
+              <a:rPr lang="pt-PT" sz="3600" dirty="0" smtClean="0">
+                <a:latin typeface="Calibri" panose="020F0502020204030204" pitchFamily="34" charset="0"/>
+                <a:cs typeface="Calibri" panose="020F0502020204030204" pitchFamily="34" charset="0"/>
+              </a:rPr>
+              <a:t> </a:t>
+            </a:r>
+            <a:r>
+              <a:rPr lang="pt-PT" sz="3600" dirty="0" err="1" smtClean="0">
+                <a:latin typeface="Calibri" panose="020F0502020204030204" pitchFamily="34" charset="0"/>
+                <a:cs typeface="Calibri" panose="020F0502020204030204" pitchFamily="34" charset="0"/>
+              </a:rPr>
+              <a:t>without</a:t>
+            </a:r>
+            <a:r>
+              <a:rPr lang="pt-PT" sz="3600" dirty="0" smtClean="0">
+                <a:latin typeface="Calibri" panose="020F0502020204030204" pitchFamily="34" charset="0"/>
+                <a:cs typeface="Calibri" panose="020F0502020204030204" pitchFamily="34" charset="0"/>
+              </a:rPr>
+              <a:t> </a:t>
+            </a:r>
+            <a:r>
+              <a:rPr lang="pt-PT" sz="3600" dirty="0" err="1" smtClean="0">
+                <a:latin typeface="Calibri" panose="020F0502020204030204" pitchFamily="34" charset="0"/>
+                <a:cs typeface="Calibri" panose="020F0502020204030204" pitchFamily="34" charset="0"/>
+              </a:rPr>
+              <a:t>floating-point</a:t>
+            </a:r>
+            <a:endParaRPr lang="pt-PT" sz="3600" dirty="0" smtClean="0">
+              <a:latin typeface="Calibri" panose="020F0502020204030204" pitchFamily="34" charset="0"/>
+              <a:cs typeface="Calibri" panose="020F0502020204030204" pitchFamily="34" charset="0"/>
+            </a:endParaRPr>
           </a:p>
           <a:p>
             <a:pPr marL="571500" indent="-571500">
@@ -10979,14 +11105,7 @@
                 <a:latin typeface="Calibri" panose="020F0502020204030204" pitchFamily="34" charset="0"/>
                 <a:cs typeface="Calibri" panose="020F0502020204030204" pitchFamily="34" charset="0"/>
               </a:rPr>
-              <a:t> 0’s</a:t>
-            </a:r>
-            <a:r>
-              <a:rPr lang="pt-PT" sz="8000" dirty="0" smtClean="0">
-                <a:latin typeface="Calibri" panose="020F0502020204030204" pitchFamily="34" charset="0"/>
-                <a:cs typeface="Calibri" panose="020F0502020204030204" pitchFamily="34" charset="0"/>
-              </a:rPr>
-              <a:t>?</a:t>
+              <a:t> 0’s?</a:t>
             </a:r>
             <a:endParaRPr lang="pt-PT" sz="8000" dirty="0">
               <a:latin typeface="Calibri" panose="020F0502020204030204" pitchFamily="34" charset="0"/>
@@ -11807,6 +11926,15 @@
 </file>
 
 <file path=customXml/item1.xml><?xml version="1.0" encoding="utf-8"?>
+<?mso-contentType ?>
+<FormTemplates xmlns="http://schemas.microsoft.com/sharepoint/v3/contenttype/forms">
+  <Display>DocumentLibraryForm</Display>
+  <Edit>DocumentLibraryForm</Edit>
+  <New>DocumentLibraryForm</New>
+</FormTemplates>
+</file>
+
+<file path=customXml/item2.xml><?xml version="1.0" encoding="utf-8"?>
 <ct:contentTypeSchema xmlns:ct="http://schemas.microsoft.com/office/2006/metadata/contentType" xmlns:ma="http://schemas.microsoft.com/office/2006/metadata/properties/metaAttributes" ct:_="" ma:_="" ma:contentTypeName="Document" ma:contentTypeID="0x01010079F111ED35F8CC479449609E8A0923A6" ma:contentTypeVersion="11" ma:contentTypeDescription="Create a new document." ma:contentTypeScope="" ma:versionID="9677210f24a1be23c92c90fd886aa0aa">
   <xsd:schema xmlns:xsd="http://www.w3.org/2001/XMLSchema" xmlns:xs="http://www.w3.org/2001/XMLSchema" xmlns:p="http://schemas.microsoft.com/office/2006/metadata/properties" xmlns:ns2="71af3243-3dd4-4a8d-8c0d-dd76da1f02a5" xmlns:ns3="16c05727-aa75-4e4a-9b5f-8a80a1165891" targetNamespace="http://schemas.microsoft.com/office/2006/metadata/properties" ma:root="true" ma:fieldsID="60e05723c5c1908df1a1a4ebf11d344e" ns2:_="" ns3:_="">
     <xsd:import namespace="71af3243-3dd4-4a8d-8c0d-dd76da1f02a5"/>
@@ -12017,15 +12145,6 @@
 </ct:contentTypeSchema>
 </file>
 
-<file path=customXml/item2.xml><?xml version="1.0" encoding="utf-8"?>
-<?mso-contentType ?>
-<FormTemplates xmlns="http://schemas.microsoft.com/sharepoint/v3/contenttype/forms">
-  <Display>DocumentLibraryForm</Display>
-  <Edit>DocumentLibraryForm</Edit>
-  <New>DocumentLibraryForm</New>
-</FormTemplates>
-</file>
-
 <file path=customXml/item3.xml><?xml version="1.0" encoding="utf-8"?>
 <p:properties xmlns:p="http://schemas.microsoft.com/office/2006/metadata/properties" xmlns:xsi="http://www.w3.org/2001/XMLSchema-instance" xmlns:pc="http://schemas.microsoft.com/office/infopath/2007/PartnerControls">
   <documentManagement>
@@ -12035,6 +12154,14 @@
 </file>
 
 <file path=customXml/itemProps1.xml><?xml version="1.0" encoding="utf-8"?>
+<ds:datastoreItem xmlns:ds="http://schemas.openxmlformats.org/officeDocument/2006/customXml" ds:itemID="{2FD05317-60D6-4B3A-8545-888496D1A8EC}">
+  <ds:schemaRefs>
+    <ds:schemaRef ds:uri="http://schemas.microsoft.com/sharepoint/v3/contenttype/forms"/>
+  </ds:schemaRefs>
+</ds:datastoreItem>
+</file>
+
+<file path=customXml/itemProps2.xml><?xml version="1.0" encoding="utf-8"?>
 <ds:datastoreItem xmlns:ds="http://schemas.openxmlformats.org/officeDocument/2006/customXml" ds:itemID="{61A00BBF-EEBB-4E18-B8CB-F926EAAC48F7}">
   <ds:schemaRefs>
     <ds:schemaRef ds:uri="http://schemas.microsoft.com/office/2006/metadata/contentType"/>
@@ -12049,14 +12176,6 @@
     <ds:schemaRef ds:uri="http://purl.org/dc/elements/1.1/"/>
     <ds:schemaRef ds:uri="http://purl.org/dc/terms/"/>
     <ds:schemaRef ds:uri="http://schemas.microsoft.com/internal/obd"/>
-  </ds:schemaRefs>
-</ds:datastoreItem>
-</file>
-
-<file path=customXml/itemProps2.xml><?xml version="1.0" encoding="utf-8"?>
-<ds:datastoreItem xmlns:ds="http://schemas.openxmlformats.org/officeDocument/2006/customXml" ds:itemID="{2FD05317-60D6-4B3A-8545-888496D1A8EC}">
-  <ds:schemaRefs>
-    <ds:schemaRef ds:uri="http://schemas.microsoft.com/sharepoint/v3/contenttype/forms"/>
   </ds:schemaRefs>
 </ds:datastoreItem>
 </file>

</xml_diff>